<commit_message>
Worked on intern presentation
</commit_message>
<xml_diff>
--- a/Presentation/Internship Presentation.pptx
+++ b/Presentation/Internship Presentation.pptx
@@ -18,6 +18,8 @@
     <p:sldId id="264" r:id="rId12"/>
     <p:sldId id="269" r:id="rId13"/>
     <p:sldId id="265" r:id="rId14"/>
+    <p:sldId id="273" r:id="rId15"/>
+    <p:sldId id="274" r:id="rId16"/>
   </p:sldIdLst>
   <p:sldSz cx="9144000" cy="6858000" type="screen4x3"/>
   <p:notesSz cx="6858000" cy="9144000"/>
@@ -116,6 +118,22 @@
       </a:defRPr>
     </a:lvl9pPr>
   </p:defaultTextStyle>
+  <p:extLst>
+    <p:ext uri="{EFAFB233-063F-42B5-8137-9DF3F51BA10A}">
+      <p15:sldGuideLst xmlns:p15="http://schemas.microsoft.com/office/powerpoint/2012/main">
+        <p15:guide id="1" orient="horz" pos="2160">
+          <p15:clr>
+            <a:srgbClr val="A4A3A4"/>
+          </p15:clr>
+        </p15:guide>
+        <p15:guide id="2" pos="2880">
+          <p15:clr>
+            <a:srgbClr val="A4A3A4"/>
+          </p15:clr>
+        </p15:guide>
+      </p15:sldGuideLst>
+    </p:ext>
+  </p:extLst>
 </p:presentation>
 </file>
 
@@ -13780,11 +13798,7 @@
           <a:p>
             <a:r>
               <a:rPr lang="en-US" dirty="0" smtClean="0"/>
-              <a:t>Vruti </a:t>
-            </a:r>
-            <a:r>
-              <a:rPr lang="en-US" dirty="0" smtClean="0"/>
-              <a:t>Sivakumaran</a:t>
+              <a:t>Vruti Sivakumaran</a:t>
             </a:r>
             <a:endParaRPr lang="en-US" dirty="0"/>
           </a:p>
@@ -13844,7 +13858,11 @@
           <a:p>
             <a:r>
               <a:rPr lang="en-US" dirty="0" smtClean="0"/>
-              <a:t>The Solution</a:t>
+              <a:t>The </a:t>
+            </a:r>
+            <a:r>
+              <a:rPr lang="en-US" dirty="0" smtClean="0"/>
+              <a:t>Project - Solution</a:t>
             </a:r>
             <a:endParaRPr lang="en-US" dirty="0"/>
           </a:p>
@@ -13860,14 +13878,80 @@
             <p:ph idx="1"/>
           </p:nvPr>
         </p:nvSpPr>
-        <p:spPr/>
+        <p:spPr>
+          <a:xfrm>
+            <a:off x="1043492" y="2323652"/>
+            <a:ext cx="6777317" cy="4000948"/>
+          </a:xfrm>
+        </p:spPr>
         <p:txBody>
           <a:bodyPr/>
           <a:lstStyle/>
           <a:p>
+            <a:pPr>
+              <a:lnSpc>
+                <a:spcPct val="150000"/>
+              </a:lnSpc>
+            </a:pPr>
             <a:r>
               <a:rPr lang="en-US" dirty="0" smtClean="0"/>
-              <a:t>Specifications</a:t>
+              <a:t>A program that can:</a:t>
+            </a:r>
+          </a:p>
+          <a:p>
+            <a:pPr lvl="1">
+              <a:lnSpc>
+                <a:spcPct val="150000"/>
+              </a:lnSpc>
+            </a:pPr>
+            <a:r>
+              <a:rPr lang="en-US" dirty="0" smtClean="0"/>
+              <a:t>R</a:t>
+            </a:r>
+            <a:r>
+              <a:rPr lang="en-US" dirty="0" smtClean="0"/>
+              <a:t>ead information from all the </a:t>
+            </a:r>
+            <a:r>
+              <a:rPr lang="en-US" dirty="0" smtClean="0"/>
+              <a:t>different types of reports</a:t>
+            </a:r>
+          </a:p>
+          <a:p>
+            <a:pPr lvl="1">
+              <a:lnSpc>
+                <a:spcPct val="150000"/>
+              </a:lnSpc>
+            </a:pPr>
+            <a:r>
+              <a:rPr lang="en-US" dirty="0" smtClean="0"/>
+              <a:t>Identify the necessary data</a:t>
+            </a:r>
+          </a:p>
+          <a:p>
+            <a:pPr lvl="1">
+              <a:lnSpc>
+                <a:spcPct val="150000"/>
+              </a:lnSpc>
+            </a:pPr>
+            <a:r>
+              <a:rPr lang="en-US" dirty="0" smtClean="0"/>
+              <a:t>Ensure that this data is valid</a:t>
+            </a:r>
+          </a:p>
+          <a:p>
+            <a:pPr lvl="1">
+              <a:lnSpc>
+                <a:spcPct val="150000"/>
+              </a:lnSpc>
+            </a:pPr>
+            <a:r>
+              <a:rPr lang="en-US" dirty="0" smtClean="0"/>
+              <a:t>Write the data into an Excel file so that it can be imported into </a:t>
+            </a:r>
+            <a:r>
+              <a:rPr lang="en-US" dirty="0" err="1" smtClean="0"/>
+              <a:t>MPulse</a:t>
             </a:r>
             <a:endParaRPr lang="en-US" dirty="0"/>
           </a:p>
@@ -13927,7 +14011,7 @@
           <a:p>
             <a:r>
               <a:rPr lang="en-US" dirty="0" smtClean="0"/>
-              <a:t>Demonstration</a:t>
+              <a:t>Final Product</a:t>
             </a:r>
             <a:endParaRPr lang="en-US" dirty="0"/>
           </a:p>
@@ -14043,7 +14127,7 @@
           <a:p>
             <a:r>
               <a:rPr lang="en-US" dirty="0" smtClean="0"/>
-              <a:t>Demonstration</a:t>
+              <a:t>Final Product</a:t>
             </a:r>
             <a:endParaRPr lang="en-US" dirty="0"/>
           </a:p>
@@ -14176,6 +14260,138 @@
 </p:sld>
 </file>
 
+<file path=ppt/slides/slide14.xml><?xml version="1.0" encoding="utf-8"?>
+<p:sld xmlns:a="http://schemas.openxmlformats.org/drawingml/2006/main" xmlns:r="http://schemas.openxmlformats.org/officeDocument/2006/relationships" xmlns:p="http://schemas.openxmlformats.org/presentationml/2006/main">
+  <p:cSld>
+    <p:spTree>
+      <p:nvGrpSpPr>
+        <p:cNvPr id="1" name=""/>
+        <p:cNvGrpSpPr/>
+        <p:nvPr/>
+      </p:nvGrpSpPr>
+      <p:grpSpPr>
+        <a:xfrm>
+          <a:off x="0" y="0"/>
+          <a:ext cx="0" cy="0"/>
+          <a:chOff x="0" y="0"/>
+          <a:chExt cx="0" cy="0"/>
+        </a:xfrm>
+      </p:grpSpPr>
+      <p:sp>
+        <p:nvSpPr>
+          <p:cNvPr id="2" name="Title 1"/>
+          <p:cNvSpPr>
+            <a:spLocks noGrp="1"/>
+          </p:cNvSpPr>
+          <p:nvPr>
+            <p:ph type="title"/>
+          </p:nvPr>
+        </p:nvSpPr>
+        <p:spPr>
+          <a:xfrm>
+            <a:off x="1059628" y="2857500"/>
+            <a:ext cx="7024744" cy="1143000"/>
+          </a:xfrm>
+        </p:spPr>
+        <p:txBody>
+          <a:bodyPr anchor="ctr"/>
+          <a:lstStyle/>
+          <a:p>
+            <a:pPr algn="ctr"/>
+            <a:r>
+              <a:rPr lang="en-US" dirty="0" smtClean="0"/>
+              <a:t>Questions?</a:t>
+            </a:r>
+            <a:endParaRPr lang="en-US" dirty="0"/>
+          </a:p>
+        </p:txBody>
+      </p:sp>
+    </p:spTree>
+    <p:extLst>
+      <p:ext uri="{BB962C8B-B14F-4D97-AF65-F5344CB8AC3E}">
+        <p14:creationId xmlns:p14="http://schemas.microsoft.com/office/powerpoint/2010/main" val="2416223342"/>
+      </p:ext>
+    </p:extLst>
+  </p:cSld>
+  <p:clrMapOvr>
+    <a:masterClrMapping/>
+  </p:clrMapOvr>
+  <p:timing>
+    <p:tnLst>
+      <p:par>
+        <p:cTn id="1" dur="indefinite" restart="never" nodeType="tmRoot"/>
+      </p:par>
+    </p:tnLst>
+  </p:timing>
+</p:sld>
+</file>
+
+<file path=ppt/slides/slide15.xml><?xml version="1.0" encoding="utf-8"?>
+<p:sld xmlns:a="http://schemas.openxmlformats.org/drawingml/2006/main" xmlns:r="http://schemas.openxmlformats.org/officeDocument/2006/relationships" xmlns:p="http://schemas.openxmlformats.org/presentationml/2006/main">
+  <p:cSld>
+    <p:spTree>
+      <p:nvGrpSpPr>
+        <p:cNvPr id="1" name=""/>
+        <p:cNvGrpSpPr/>
+        <p:nvPr/>
+      </p:nvGrpSpPr>
+      <p:grpSpPr>
+        <a:xfrm>
+          <a:off x="0" y="0"/>
+          <a:ext cx="0" cy="0"/>
+          <a:chOff x="0" y="0"/>
+          <a:chExt cx="0" cy="0"/>
+        </a:xfrm>
+      </p:grpSpPr>
+      <p:sp>
+        <p:nvSpPr>
+          <p:cNvPr id="2" name="Title 1"/>
+          <p:cNvSpPr>
+            <a:spLocks noGrp="1"/>
+          </p:cNvSpPr>
+          <p:nvPr>
+            <p:ph type="title"/>
+          </p:nvPr>
+        </p:nvSpPr>
+        <p:spPr>
+          <a:xfrm>
+            <a:off x="1059628" y="2857500"/>
+            <a:ext cx="7024744" cy="1143000"/>
+          </a:xfrm>
+        </p:spPr>
+        <p:txBody>
+          <a:bodyPr anchor="ctr"/>
+          <a:lstStyle/>
+          <a:p>
+            <a:pPr algn="ctr"/>
+            <a:r>
+              <a:rPr lang="en-US" dirty="0" smtClean="0"/>
+              <a:t>Thank You!</a:t>
+            </a:r>
+            <a:endParaRPr lang="en-US" dirty="0"/>
+          </a:p>
+        </p:txBody>
+      </p:sp>
+    </p:spTree>
+    <p:extLst>
+      <p:ext uri="{BB962C8B-B14F-4D97-AF65-F5344CB8AC3E}">
+        <p14:creationId xmlns:p14="http://schemas.microsoft.com/office/powerpoint/2010/main" val="2784345327"/>
+      </p:ext>
+    </p:extLst>
+  </p:cSld>
+  <p:clrMapOvr>
+    <a:masterClrMapping/>
+  </p:clrMapOvr>
+  <p:timing>
+    <p:tnLst>
+      <p:par>
+        <p:cTn id="1" dur="indefinite" restart="never" nodeType="tmRoot"/>
+      </p:par>
+    </p:tnLst>
+  </p:timing>
+</p:sld>
+</file>
+
 <file path=ppt/slides/slide2.xml><?xml version="1.0" encoding="utf-8"?>
 <p:sld xmlns:a="http://schemas.openxmlformats.org/drawingml/2006/main" xmlns:r="http://schemas.openxmlformats.org/officeDocument/2006/relationships" xmlns:p="http://schemas.openxmlformats.org/presentationml/2006/main">
   <p:cSld>
@@ -14226,50 +14442,89 @@
             <p:ph idx="1"/>
           </p:nvPr>
         </p:nvSpPr>
-        <p:spPr/>
+        <p:spPr>
+          <a:xfrm>
+            <a:off x="1043492" y="2323652"/>
+            <a:ext cx="6777317" cy="3924748"/>
+          </a:xfrm>
+        </p:spPr>
         <p:txBody>
-          <a:bodyPr/>
+          <a:bodyPr>
+            <a:normAutofit fontScale="92500"/>
+          </a:bodyPr>
           <a:lstStyle/>
           <a:p>
+            <a:pPr>
+              <a:lnSpc>
+                <a:spcPct val="150000"/>
+              </a:lnSpc>
+            </a:pPr>
             <a:r>
               <a:rPr lang="en-US" dirty="0" smtClean="0"/>
               <a:t>Introduction</a:t>
             </a:r>
           </a:p>
           <a:p>
+            <a:pPr>
+              <a:lnSpc>
+                <a:spcPct val="150000"/>
+              </a:lnSpc>
+            </a:pPr>
             <a:r>
               <a:rPr lang="en-US" dirty="0" smtClean="0"/>
               <a:t>My Role</a:t>
             </a:r>
           </a:p>
           <a:p>
+            <a:pPr>
+              <a:lnSpc>
+                <a:spcPct val="150000"/>
+              </a:lnSpc>
+            </a:pPr>
             <a:r>
               <a:rPr lang="en-US" dirty="0" smtClean="0"/>
               <a:t>The Project</a:t>
             </a:r>
           </a:p>
           <a:p>
-            <a:pPr lvl="1"/>
+            <a:pPr lvl="1">
+              <a:lnSpc>
+                <a:spcPct val="150000"/>
+              </a:lnSpc>
+            </a:pPr>
             <a:r>
               <a:rPr lang="en-US" dirty="0" smtClean="0"/>
               <a:t>Background Information</a:t>
             </a:r>
           </a:p>
           <a:p>
-            <a:pPr lvl="1"/>
+            <a:pPr lvl="1">
+              <a:lnSpc>
+                <a:spcPct val="150000"/>
+              </a:lnSpc>
+            </a:pPr>
             <a:r>
               <a:rPr lang="en-US" dirty="0" smtClean="0"/>
               <a:t>The Solution</a:t>
             </a:r>
           </a:p>
           <a:p>
-            <a:pPr lvl="1"/>
+            <a:pPr lvl="1">
+              <a:lnSpc>
+                <a:spcPct val="150000"/>
+              </a:lnSpc>
+            </a:pPr>
             <a:r>
               <a:rPr lang="en-US" dirty="0" smtClean="0"/>
               <a:t>Final Product</a:t>
             </a:r>
           </a:p>
           <a:p>
+            <a:pPr>
+              <a:lnSpc>
+                <a:spcPct val="150000"/>
+              </a:lnSpc>
+            </a:pPr>
             <a:r>
               <a:rPr lang="en-US" dirty="0" smtClean="0"/>
               <a:t>What I Learned</a:t>
@@ -14353,32 +14608,55 @@
           <a:bodyPr/>
           <a:lstStyle/>
           <a:p>
+            <a:pPr>
+              <a:lnSpc>
+                <a:spcPct val="150000"/>
+              </a:lnSpc>
+            </a:pPr>
             <a:r>
               <a:rPr lang="en-US" dirty="0" smtClean="0"/>
               <a:t>Carnegie Mellon University</a:t>
             </a:r>
           </a:p>
           <a:p>
-            <a:pPr lvl="1"/>
+            <a:pPr lvl="1">
+              <a:lnSpc>
+                <a:spcPct val="150000"/>
+              </a:lnSpc>
+            </a:pPr>
             <a:r>
               <a:rPr lang="en-US" dirty="0" smtClean="0"/>
               <a:t>Electrical and Computer Engineering</a:t>
             </a:r>
           </a:p>
           <a:p>
-            <a:pPr lvl="1"/>
+            <a:pPr lvl="1">
+              <a:lnSpc>
+                <a:spcPct val="150000"/>
+              </a:lnSpc>
+            </a:pPr>
             <a:r>
               <a:rPr lang="en-US" dirty="0" smtClean="0"/>
               <a:t>Rising Senior</a:t>
             </a:r>
           </a:p>
           <a:p>
+            <a:pPr>
+              <a:lnSpc>
+                <a:spcPct val="150000"/>
+              </a:lnSpc>
+            </a:pPr>
             <a:r>
               <a:rPr lang="en-US" dirty="0" smtClean="0"/>
               <a:t>Operations Department</a:t>
             </a:r>
           </a:p>
           <a:p>
+            <a:pPr lvl="1">
+              <a:lnSpc>
+                <a:spcPct val="150000"/>
+              </a:lnSpc>
+            </a:pPr>
             <a:r>
               <a:rPr lang="en-US" dirty="0" smtClean="0"/>
               <a:t>Supervisor: Kevin Wigell</a:t>
@@ -14457,11 +14735,92 @@
             <p:ph idx="1"/>
           </p:nvPr>
         </p:nvSpPr>
-        <p:spPr/>
+        <p:spPr>
+          <a:xfrm>
+            <a:off x="1043492" y="2323652"/>
+            <a:ext cx="6777317" cy="4000948"/>
+          </a:xfrm>
+        </p:spPr>
         <p:txBody>
-          <a:bodyPr/>
+          <a:bodyPr>
+            <a:normAutofit lnSpcReduction="10000"/>
+          </a:bodyPr>
           <a:lstStyle/>
           <a:p>
+            <a:pPr marL="342900" lvl="1">
+              <a:lnSpc>
+                <a:spcPct val="150000"/>
+              </a:lnSpc>
+            </a:pPr>
+            <a:r>
+              <a:rPr lang="en-US" dirty="0" smtClean="0"/>
+              <a:t>Help Kevin with </a:t>
+            </a:r>
+            <a:r>
+              <a:rPr lang="en-US" dirty="0" err="1" smtClean="0"/>
+              <a:t>MPulse</a:t>
+            </a:r>
+            <a:endParaRPr lang="en-US" dirty="0" smtClean="0"/>
+          </a:p>
+          <a:p>
+            <a:pPr marL="342900" lvl="1">
+              <a:lnSpc>
+                <a:spcPct val="150000"/>
+              </a:lnSpc>
+            </a:pPr>
+            <a:r>
+              <a:rPr lang="en-US" dirty="0" err="1" smtClean="0"/>
+              <a:t>MPulse</a:t>
+            </a:r>
+            <a:r>
+              <a:rPr lang="en-US" dirty="0" smtClean="0"/>
+              <a:t>:</a:t>
+            </a:r>
+          </a:p>
+          <a:p>
+            <a:pPr marL="617220" lvl="2">
+              <a:lnSpc>
+                <a:spcPct val="150000"/>
+              </a:lnSpc>
+            </a:pPr>
+            <a:r>
+              <a:rPr lang="en-US" dirty="0" smtClean="0"/>
+              <a:t>Computerized </a:t>
+            </a:r>
+            <a:r>
+              <a:rPr lang="en-US" dirty="0"/>
+              <a:t>Maintenance Management </a:t>
+            </a:r>
+            <a:r>
+              <a:rPr lang="en-US" dirty="0" smtClean="0"/>
+              <a:t>System (CMMS)</a:t>
+            </a:r>
+          </a:p>
+          <a:p>
+            <a:pPr marL="617220" lvl="2">
+              <a:lnSpc>
+                <a:spcPct val="150000"/>
+              </a:lnSpc>
+            </a:pPr>
+            <a:r>
+              <a:rPr lang="en-US" dirty="0" smtClean="0"/>
+              <a:t>Contains</a:t>
+            </a:r>
+            <a:r>
+              <a:rPr lang="en-US" dirty="0" smtClean="0"/>
+              <a:t> information about maintenance work done on windfarms.</a:t>
+            </a:r>
+          </a:p>
+          <a:p>
+            <a:pPr marL="342900" lvl="1">
+              <a:lnSpc>
+                <a:spcPct val="150000"/>
+              </a:lnSpc>
+            </a:pPr>
+            <a:r>
+              <a:rPr lang="en-US" dirty="0" smtClean="0"/>
+              <a:t>Ensure that all the right information can be found</a:t>
+            </a:r>
             <a:endParaRPr lang="en-US" dirty="0"/>
           </a:p>
         </p:txBody>
@@ -14522,7 +14881,11 @@
           <a:p>
             <a:r>
               <a:rPr lang="en-US" sz="3600" dirty="0" smtClean="0"/>
-              <a:t>The Project</a:t>
+              <a:t>The </a:t>
+            </a:r>
+            <a:r>
+              <a:rPr lang="en-US" sz="3600" dirty="0" smtClean="0"/>
+              <a:t>Project - Background</a:t>
             </a:r>
             <a:endParaRPr lang="en-US" sz="3600" dirty="0"/>
           </a:p>
@@ -14540,33 +14903,34 @@
         </p:nvSpPr>
         <p:spPr/>
         <p:txBody>
-          <a:bodyPr/>
+          <a:bodyPr>
+            <a:normAutofit fontScale="92500"/>
+          </a:bodyPr>
           <a:lstStyle/>
           <a:p>
-            <a:r>
-              <a:rPr lang="en-US" dirty="0"/>
-              <a:t>Background </a:t>
-            </a:r>
-            <a:r>
-              <a:rPr lang="en-US" dirty="0" smtClean="0"/>
-              <a:t>Information:</a:t>
-            </a:r>
-          </a:p>
-          <a:p>
-            <a:pPr lvl="1">
+            <a:pPr>
               <a:lnSpc>
-                <a:spcPct val="150000"/>
+                <a:spcPct val="200000"/>
               </a:lnSpc>
             </a:pPr>
             <a:r>
               <a:rPr lang="en-US" dirty="0" smtClean="0"/>
-              <a:t>7 Wind Farms, 5 Contractor</a:t>
+              <a:t>7 </a:t>
             </a:r>
-          </a:p>
-          <a:p>
-            <a:pPr lvl="1">
+            <a:r>
+              <a:rPr lang="en-US" dirty="0" smtClean="0"/>
+              <a:t>Wind Farms, 5 </a:t>
+            </a:r>
+            <a:r>
+              <a:rPr lang="en-US" dirty="0" smtClean="0"/>
+              <a:t>Contractors</a:t>
+            </a:r>
+            <a:endParaRPr lang="en-US" dirty="0" smtClean="0"/>
+          </a:p>
+          <a:p>
+            <a:pPr>
               <a:lnSpc>
-                <a:spcPct val="150000"/>
+                <a:spcPct val="200000"/>
               </a:lnSpc>
             </a:pPr>
             <a:r>
@@ -14575,18 +14939,30 @@
             </a:r>
           </a:p>
           <a:p>
-            <a:pPr lvl="1">
+            <a:pPr>
               <a:lnSpc>
-                <a:spcPct val="150000"/>
+                <a:spcPct val="200000"/>
               </a:lnSpc>
             </a:pPr>
             <a:r>
               <a:rPr lang="en-US" dirty="0" smtClean="0"/>
-              <a:t>Reports made when maintenance done</a:t>
+              <a:t>Reports </a:t>
             </a:r>
-          </a:p>
-          <a:p>
-            <a:pPr lvl="1"/>
+            <a:r>
+              <a:rPr lang="en-US" dirty="0" smtClean="0"/>
+              <a:t>provided </a:t>
+            </a:r>
+            <a:r>
+              <a:rPr lang="en-US" dirty="0" smtClean="0"/>
+              <a:t>when maintenance done</a:t>
+            </a:r>
+          </a:p>
+          <a:p>
+            <a:pPr>
+              <a:lnSpc>
+                <a:spcPct val="200000"/>
+              </a:lnSpc>
+            </a:pPr>
             <a:r>
               <a:rPr lang="en-US" dirty="0" smtClean="0"/>
               <a:t>Numerous reports every week</a:t>
@@ -14651,7 +15027,11 @@
           <a:p>
             <a:r>
               <a:rPr lang="en-US" sz="3600" dirty="0" smtClean="0"/>
-              <a:t>The Project</a:t>
+              <a:t>The </a:t>
+            </a:r>
+            <a:r>
+              <a:rPr lang="en-US" sz="3600" dirty="0" smtClean="0"/>
+              <a:t>Project - Background</a:t>
             </a:r>
             <a:endParaRPr lang="en-US" sz="3600" dirty="0"/>
           </a:p>
@@ -14667,29 +15047,60 @@
             <p:ph idx="1"/>
           </p:nvPr>
         </p:nvSpPr>
-        <p:spPr/>
+        <p:spPr>
+          <a:xfrm>
+            <a:off x="1043492" y="2323652"/>
+            <a:ext cx="6777317" cy="4077148"/>
+          </a:xfrm>
+        </p:spPr>
         <p:txBody>
-          <a:bodyPr/>
+          <a:bodyPr>
+            <a:normAutofit/>
+          </a:bodyPr>
           <a:lstStyle/>
           <a:p>
+            <a:pPr>
+              <a:lnSpc>
+                <a:spcPct val="150000"/>
+              </a:lnSpc>
+            </a:pPr>
             <a:r>
-              <a:rPr lang="en-US" dirty="0"/>
-              <a:t>Background </a:t>
+              <a:rPr lang="en-US" dirty="0" smtClean="0"/>
+              <a:t>Each contractor provides reports in a different format</a:t>
             </a:r>
             <a:r>
               <a:rPr lang="en-US" dirty="0" smtClean="0"/>
-              <a:t>Information:</a:t>
+              <a:t>.</a:t>
             </a:r>
           </a:p>
           <a:p>
-            <a:pPr lvl="1"/>
+            <a:pPr>
+              <a:lnSpc>
+                <a:spcPct val="150000"/>
+              </a:lnSpc>
+            </a:pPr>
             <a:r>
               <a:rPr lang="en-US" dirty="0" smtClean="0"/>
-              <a:t>Maintenance information stored in Computerized Maintenance </a:t>
+              <a:t>No easy way to get information from reports into </a:t>
             </a:r>
             <a:r>
-              <a:rPr lang="en-US" smtClean="0"/>
-              <a:t>Management System.</a:t>
+              <a:rPr lang="en-US" dirty="0" err="1" smtClean="0"/>
+              <a:t>MPulse</a:t>
+            </a:r>
+            <a:r>
+              <a:rPr lang="en-US" dirty="0" smtClean="0"/>
+              <a:t>.</a:t>
+            </a:r>
+          </a:p>
+          <a:p>
+            <a:pPr>
+              <a:lnSpc>
+                <a:spcPct val="150000"/>
+              </a:lnSpc>
+            </a:pPr>
+            <a:r>
+              <a:rPr lang="en-US" dirty="0" smtClean="0"/>
+              <a:t>Needed a way to get all the necessary information from the different reports.</a:t>
             </a:r>
             <a:endParaRPr lang="en-US" dirty="0" smtClean="0"/>
           </a:p>

</xml_diff>